<commit_message>
Updated code to process 4 sample images.
</commit_message>
<xml_diff>
--- a/AsteroidMining.pptx
+++ b/AsteroidMining.pptx
@@ -13,6 +13,7 @@
     <p:sldId id="261" r:id="rId7"/>
     <p:sldId id="262" r:id="rId8"/>
     <p:sldId id="263" r:id="rId9"/>
+    <p:sldId id="264" r:id="rId10"/>
   </p:sldIdLst>
   <p:sldSz cx="12192000" cy="6858000"/>
   <p:notesSz cx="6858000" cy="9144000"/>
@@ -7031,6 +7032,134 @@
 </p:sld>
 </file>
 
+<file path=ppt/slides/slide9.xml><?xml version="1.0" encoding="utf-8"?>
+<p:sld xmlns:a="http://schemas.openxmlformats.org/drawingml/2006/main" xmlns:r="http://schemas.openxmlformats.org/officeDocument/2006/relationships" xmlns:p="http://schemas.openxmlformats.org/presentationml/2006/main">
+  <p:cSld>
+    <p:spTree>
+      <p:nvGrpSpPr>
+        <p:cNvPr id="1" name=""/>
+        <p:cNvGrpSpPr/>
+        <p:nvPr/>
+      </p:nvGrpSpPr>
+      <p:grpSpPr>
+        <a:xfrm>
+          <a:off x="0" y="0"/>
+          <a:ext cx="0" cy="0"/>
+          <a:chOff x="0" y="0"/>
+          <a:chExt cx="0" cy="0"/>
+        </a:xfrm>
+      </p:grpSpPr>
+      <p:sp>
+        <p:nvSpPr>
+          <p:cNvPr id="2" name="Title 1"/>
+          <p:cNvSpPr>
+            <a:spLocks noGrp="1"/>
+          </p:cNvSpPr>
+          <p:nvPr>
+            <p:ph type="title"/>
+          </p:nvPr>
+        </p:nvSpPr>
+        <p:spPr/>
+        <p:txBody>
+          <a:bodyPr/>
+          <a:lstStyle/>
+          <a:p>
+            <a:r>
+              <a:rPr lang="en-US" dirty="0" smtClean="0"/>
+              <a:t>All Wavelength Histograms</a:t>
+            </a:r>
+            <a:endParaRPr lang="en-US" dirty="0"/>
+          </a:p>
+        </p:txBody>
+      </p:sp>
+      <p:sp>
+        <p:nvSpPr>
+          <p:cNvPr id="3" name="Content Placeholder 2"/>
+          <p:cNvSpPr>
+            <a:spLocks noGrp="1"/>
+          </p:cNvSpPr>
+          <p:nvPr>
+            <p:ph idx="1"/>
+          </p:nvPr>
+        </p:nvSpPr>
+        <p:spPr/>
+        <p:txBody>
+          <a:bodyPr/>
+          <a:lstStyle/>
+          <a:p>
+            <a:r>
+              <a:rPr lang="en-US" dirty="0" smtClean="0"/>
+              <a:t>Blue: Ida</a:t>
+            </a:r>
+          </a:p>
+          <a:p>
+            <a:r>
+              <a:rPr lang="en-US" dirty="0" smtClean="0"/>
+              <a:t>Green: </a:t>
+            </a:r>
+            <a:r>
+              <a:rPr lang="en-US" dirty="0" err="1" smtClean="0"/>
+              <a:t>Olivite</a:t>
+            </a:r>
+            <a:endParaRPr lang="en-US" dirty="0" smtClean="0"/>
+          </a:p>
+          <a:p>
+            <a:r>
+              <a:rPr lang="en-US" dirty="0" smtClean="0"/>
+              <a:t>Red: Chondrite</a:t>
+            </a:r>
+          </a:p>
+          <a:p>
+            <a:r>
+              <a:rPr lang="en-US" smtClean="0"/>
+              <a:t>Light blue: Eros</a:t>
+            </a:r>
+          </a:p>
+        </p:txBody>
+      </p:sp>
+      <p:pic>
+        <p:nvPicPr>
+          <p:cNvPr id="6" name="Picture 5"/>
+          <p:cNvPicPr>
+            <a:picLocks noChangeAspect="1"/>
+          </p:cNvPicPr>
+          <p:nvPr/>
+        </p:nvPicPr>
+        <p:blipFill>
+          <a:blip r:embed="rId2">
+            <a:extLst>
+              <a:ext uri="{28A0092B-C50C-407E-A947-70E740481C1C}">
+                <a14:useLocalDpi xmlns:a14="http://schemas.microsoft.com/office/drawing/2010/main" val="0"/>
+              </a:ext>
+            </a:extLst>
+          </a:blip>
+          <a:stretch>
+            <a:fillRect/>
+          </a:stretch>
+        </p:blipFill>
+        <p:spPr>
+          <a:xfrm>
+            <a:off x="5202620" y="2194560"/>
+            <a:ext cx="6138041" cy="4603531"/>
+          </a:xfrm>
+          <a:prstGeom prst="rect">
+            <a:avLst/>
+          </a:prstGeom>
+        </p:spPr>
+      </p:pic>
+    </p:spTree>
+    <p:extLst>
+      <p:ext uri="{BB962C8B-B14F-4D97-AF65-F5344CB8AC3E}">
+        <p14:creationId xmlns:p14="http://schemas.microsoft.com/office/powerpoint/2010/main" val="1951644746"/>
+      </p:ext>
+    </p:extLst>
+  </p:cSld>
+  <p:clrMapOvr>
+    <a:masterClrMapping/>
+  </p:clrMapOvr>
+</p:sld>
+</file>
+
 <file path=ppt/theme/theme1.xml><?xml version="1.0" encoding="utf-8"?>
 <a:theme xmlns:a="http://schemas.openxmlformats.org/drawingml/2006/main" name="Vapor Trail">
   <a:themeElements>

</xml_diff>